<commit_message>
Added Hands On Demos - Day 9 and 10 and Solutions to Hands On Assignments - Day 1.
</commit_message>
<xml_diff>
--- a/1. JPA Using Hibernate And  PostgreSQL/Day 2/Slides/4. Entity Relationships/entity-relationships-slides.pptx
+++ b/1. JPA Using Hibernate And  PostgreSQL/Day 2/Slides/4. Entity Relationships/entity-relationships-slides.pptx
@@ -5,7 +5,7 @@
     <p:sldMasterId id="2147483648" r:id="rId1"/>
   </p:sldMasterIdLst>
   <p:notesMasterIdLst>
-    <p:notesMasterId r:id="rId31"/>
+    <p:notesMasterId r:id="rId35"/>
   </p:notesMasterIdLst>
   <p:sldIdLst>
     <p:sldId id="256" r:id="rId3"/>
@@ -35,7 +35,11 @@
     <p:sldId id="280" r:id="rId27"/>
     <p:sldId id="282" r:id="rId28"/>
     <p:sldId id="283" r:id="rId29"/>
-    <p:sldId id="281" r:id="rId30"/>
+    <p:sldId id="285" r:id="rId30"/>
+    <p:sldId id="286" r:id="rId31"/>
+    <p:sldId id="287" r:id="rId32"/>
+    <p:sldId id="288" r:id="rId33"/>
+    <p:sldId id="281" r:id="rId34"/>
   </p:sldIdLst>
   <p:sldSz cx="12192000" cy="6858000"/>
   <p:notesSz cx="12192000" cy="6858000"/>
@@ -7748,171 +7752,28 @@
         <p:cNvGrpSpPr/>
         <p:nvPr/>
       </p:nvGrpSpPr>
-      <p:grpSpPr>
-        <a:xfrm>
-          <a:off x="0" y="0"/>
-          <a:ext cx="0" cy="0"/>
-          <a:chOff x="0" y="0"/>
-          <a:chExt cx="0" cy="0"/>
-        </a:xfrm>
-      </p:grpSpPr>
-      <p:pic>
-        <p:nvPicPr>
-          <p:cNvPr id="2" name="object 2"/>
-          <p:cNvPicPr/>
-          <p:nvPr/>
-        </p:nvPicPr>
-        <p:blipFill>
-          <a:blip r:embed="rId1" cstate="print"/>
-          <a:stretch>
-            <a:fillRect/>
-          </a:stretch>
-        </p:blipFill>
-        <p:spPr>
-          <a:xfrm>
-            <a:off x="0" y="0"/>
-            <a:ext cx="4636008" cy="6858000"/>
-          </a:xfrm>
-          <a:prstGeom prst="rect">
-            <a:avLst/>
-          </a:prstGeom>
-        </p:spPr>
-      </p:pic>
-      <p:pic>
-        <p:nvPicPr>
-          <p:cNvPr id="3" name="object 3"/>
-          <p:cNvPicPr/>
-          <p:nvPr/>
-        </p:nvPicPr>
-        <p:blipFill>
-          <a:blip r:embed="rId2" cstate="print"/>
-          <a:stretch>
-            <a:fillRect/>
-          </a:stretch>
-        </p:blipFill>
-        <p:spPr>
-          <a:xfrm>
-            <a:off x="5000878" y="1952244"/>
-            <a:ext cx="5787390" cy="365760"/>
-          </a:xfrm>
-          <a:prstGeom prst="rect">
-            <a:avLst/>
-          </a:prstGeom>
-        </p:spPr>
-      </p:pic>
-      <p:pic>
-        <p:nvPicPr>
-          <p:cNvPr id="4" name="object 4"/>
-          <p:cNvPicPr/>
-          <p:nvPr/>
-        </p:nvPicPr>
-        <p:blipFill>
-          <a:blip r:embed="rId3" cstate="print"/>
-          <a:stretch>
-            <a:fillRect/>
-          </a:stretch>
-        </p:blipFill>
-        <p:spPr>
-          <a:xfrm>
-            <a:off x="5000878" y="2546857"/>
-            <a:ext cx="5545074" cy="365760"/>
-          </a:xfrm>
-          <a:prstGeom prst="rect">
-            <a:avLst/>
-          </a:prstGeom>
-        </p:spPr>
-      </p:pic>
-      <p:pic>
-        <p:nvPicPr>
-          <p:cNvPr id="5" name="object 5"/>
-          <p:cNvPicPr/>
-          <p:nvPr/>
-        </p:nvPicPr>
-        <p:blipFill>
-          <a:blip r:embed="rId4" cstate="print"/>
-          <a:stretch>
-            <a:fillRect/>
-          </a:stretch>
-        </p:blipFill>
-        <p:spPr>
-          <a:xfrm>
-            <a:off x="5000878" y="3141217"/>
-            <a:ext cx="3029966" cy="365760"/>
-          </a:xfrm>
-          <a:prstGeom prst="rect">
-            <a:avLst/>
-          </a:prstGeom>
-        </p:spPr>
-      </p:pic>
-      <p:pic>
-        <p:nvPicPr>
-          <p:cNvPr id="6" name="object 6"/>
-          <p:cNvPicPr/>
-          <p:nvPr/>
-        </p:nvPicPr>
-        <p:blipFill>
-          <a:blip r:embed="rId5" cstate="print"/>
-          <a:stretch>
-            <a:fillRect/>
-          </a:stretch>
-        </p:blipFill>
-        <p:spPr>
-          <a:xfrm>
-            <a:off x="5000878" y="3735654"/>
-            <a:ext cx="5201538" cy="366064"/>
-          </a:xfrm>
-          <a:prstGeom prst="rect">
-            <a:avLst/>
-          </a:prstGeom>
-        </p:spPr>
-      </p:pic>
-      <p:pic>
-        <p:nvPicPr>
-          <p:cNvPr id="7" name="object 7"/>
-          <p:cNvPicPr/>
-          <p:nvPr/>
-        </p:nvPicPr>
-        <p:blipFill>
-          <a:blip r:embed="rId6" cstate="print"/>
-          <a:stretch>
-            <a:fillRect/>
-          </a:stretch>
-        </p:blipFill>
-        <p:spPr>
-          <a:xfrm>
-            <a:off x="5000878" y="4330319"/>
-            <a:ext cx="4302759" cy="365760"/>
-          </a:xfrm>
-          <a:prstGeom prst="rect">
-            <a:avLst/>
-          </a:prstGeom>
-        </p:spPr>
-      </p:pic>
-      <p:pic>
-        <p:nvPicPr>
-          <p:cNvPr id="8" name="object 8"/>
-          <p:cNvPicPr/>
-          <p:nvPr/>
-        </p:nvPicPr>
-        <p:blipFill>
-          <a:blip r:embed="rId7" cstate="print"/>
-          <a:stretch>
-            <a:fillRect/>
-          </a:stretch>
-        </p:blipFill>
-        <p:spPr>
-          <a:xfrm>
-            <a:off x="1239926" y="1947926"/>
-            <a:ext cx="2463165" cy="548639"/>
-          </a:xfrm>
-          <a:prstGeom prst="rect">
-            <a:avLst/>
-          </a:prstGeom>
-        </p:spPr>
-      </p:pic>
+      <p:grpSpPr/>
       <p:sp>
         <p:nvSpPr>
-          <p:cNvPr id="9" name="Slide Number Placeholder 8"/>
+          <p:cNvPr id="6" name="Title 5"/>
+          <p:cNvSpPr>
+            <a:spLocks noGrp="1"/>
+          </p:cNvSpPr>
+          <p:nvPr>
+            <p:ph type="title"/>
+          </p:nvPr>
+        </p:nvSpPr>
+        <p:spPr/>
+        <p:txBody>
+          <a:bodyPr/>
+          <a:p>
+            <a:endParaRPr lang="en-US"/>
+          </a:p>
+        </p:txBody>
+      </p:sp>
+      <p:sp>
+        <p:nvSpPr>
+          <p:cNvPr id="4" name="Slide Number Placeholder 3"/>
           <p:cNvSpPr>
             <a:spLocks noGrp="1"/>
           </p:cNvSpPr>
@@ -7931,6 +7792,151 @@
           </a:p>
         </p:txBody>
       </p:sp>
+      <p:sp>
+        <p:nvSpPr>
+          <p:cNvPr id="7" name="Content Placeholder 6"/>
+          <p:cNvSpPr>
+            <a:spLocks noGrp="1"/>
+          </p:cNvSpPr>
+          <p:nvPr>
+            <p:ph sz="half" idx="3"/>
+          </p:nvPr>
+        </p:nvSpPr>
+        <p:spPr/>
+        <p:txBody>
+          <a:bodyPr/>
+          <a:p>
+            <a:endParaRPr lang="en-US"/>
+          </a:p>
+        </p:txBody>
+      </p:sp>
+      <p:pic>
+        <p:nvPicPr>
+          <p:cNvPr id="9" name="Content Placeholder 8"/>
+          <p:cNvPicPr>
+            <a:picLocks noChangeAspect="1"/>
+          </p:cNvPicPr>
+          <p:nvPr>
+            <p:ph sz="half" idx="2"/>
+          </p:nvPr>
+        </p:nvPicPr>
+        <p:blipFill>
+          <a:blip r:embed="rId1"/>
+          <a:stretch>
+            <a:fillRect/>
+          </a:stretch>
+        </p:blipFill>
+        <p:spPr>
+          <a:xfrm>
+            <a:off x="609600" y="224155"/>
+            <a:ext cx="10551795" cy="6410325"/>
+          </a:xfrm>
+          <a:prstGeom prst="rect">
+            <a:avLst/>
+          </a:prstGeom>
+        </p:spPr>
+      </p:pic>
+    </p:spTree>
+  </p:cSld>
+  <p:clrMapOvr>
+    <a:masterClrMapping/>
+  </p:clrMapOvr>
+</p:sld>
+</file>
+
+<file path=ppt/slides/slide29.xml><?xml version="1.0" encoding="utf-8"?>
+<p:sld xmlns:a="http://schemas.openxmlformats.org/drawingml/2006/main" xmlns:r="http://schemas.openxmlformats.org/officeDocument/2006/relationships" xmlns:p="http://schemas.openxmlformats.org/presentationml/2006/main">
+  <p:cSld>
+    <p:spTree>
+      <p:nvGrpSpPr>
+        <p:cNvPr id="1" name=""/>
+        <p:cNvGrpSpPr/>
+        <p:nvPr/>
+      </p:nvGrpSpPr>
+      <p:grpSpPr/>
+      <p:sp>
+        <p:nvSpPr>
+          <p:cNvPr id="6" name="Title 5"/>
+          <p:cNvSpPr>
+            <a:spLocks noGrp="1"/>
+          </p:cNvSpPr>
+          <p:nvPr>
+            <p:ph type="title"/>
+          </p:nvPr>
+        </p:nvSpPr>
+        <p:spPr/>
+        <p:txBody>
+          <a:bodyPr/>
+          <a:p>
+            <a:endParaRPr lang="en-US"/>
+          </a:p>
+        </p:txBody>
+      </p:sp>
+      <p:sp>
+        <p:nvSpPr>
+          <p:cNvPr id="4" name="Slide Number Placeholder 3"/>
+          <p:cNvSpPr>
+            <a:spLocks noGrp="1"/>
+          </p:cNvSpPr>
+          <p:nvPr>
+            <p:ph type="sldNum" sz="quarter" idx="7"/>
+          </p:nvPr>
+        </p:nvSpPr>
+        <p:spPr/>
+        <p:txBody>
+          <a:bodyPr/>
+          <a:p>
+            <a:fld id="{B6F15528-21DE-4FAA-801E-634DDDAF4B2B}" type="slidenum">
+              <a:rPr/>
+            </a:fld>
+            <a:endParaRPr/>
+          </a:p>
+        </p:txBody>
+      </p:sp>
+      <p:sp>
+        <p:nvSpPr>
+          <p:cNvPr id="7" name="Content Placeholder 6"/>
+          <p:cNvSpPr>
+            <a:spLocks noGrp="1"/>
+          </p:cNvSpPr>
+          <p:nvPr>
+            <p:ph sz="half" idx="3"/>
+          </p:nvPr>
+        </p:nvSpPr>
+        <p:spPr/>
+        <p:txBody>
+          <a:bodyPr/>
+          <a:p>
+            <a:endParaRPr lang="en-US"/>
+          </a:p>
+        </p:txBody>
+      </p:sp>
+      <p:pic>
+        <p:nvPicPr>
+          <p:cNvPr id="5" name="Content Placeholder 4"/>
+          <p:cNvPicPr>
+            <a:picLocks noChangeAspect="1"/>
+          </p:cNvPicPr>
+          <p:nvPr>
+            <p:ph sz="half" idx="2"/>
+          </p:nvPr>
+        </p:nvPicPr>
+        <p:blipFill>
+          <a:blip r:embed="rId1"/>
+          <a:stretch>
+            <a:fillRect/>
+          </a:stretch>
+        </p:blipFill>
+        <p:spPr>
+          <a:xfrm>
+            <a:off x="609600" y="61595"/>
+            <a:ext cx="10676255" cy="6796405"/>
+          </a:xfrm>
+          <a:prstGeom prst="rect">
+            <a:avLst/>
+          </a:prstGeom>
+        </p:spPr>
+      </p:pic>
     </p:spTree>
   </p:cSld>
   <p:clrMapOvr>
@@ -8673,6 +8679,408 @@
       <p:sp>
         <p:nvSpPr>
           <p:cNvPr id="31" name="Slide Number Placeholder 30"/>
+          <p:cNvSpPr>
+            <a:spLocks noGrp="1"/>
+          </p:cNvSpPr>
+          <p:nvPr>
+            <p:ph type="sldNum" sz="quarter" idx="7"/>
+          </p:nvPr>
+        </p:nvSpPr>
+        <p:spPr/>
+        <p:txBody>
+          <a:bodyPr/>
+          <a:p>
+            <a:fld id="{B6F15528-21DE-4FAA-801E-634DDDAF4B2B}" type="slidenum">
+              <a:rPr/>
+            </a:fld>
+            <a:endParaRPr/>
+          </a:p>
+        </p:txBody>
+      </p:sp>
+    </p:spTree>
+  </p:cSld>
+  <p:clrMapOvr>
+    <a:masterClrMapping/>
+  </p:clrMapOvr>
+</p:sld>
+</file>
+
+<file path=ppt/slides/slide30.xml><?xml version="1.0" encoding="utf-8"?>
+<p:sld xmlns:a="http://schemas.openxmlformats.org/drawingml/2006/main" xmlns:r="http://schemas.openxmlformats.org/officeDocument/2006/relationships" xmlns:p="http://schemas.openxmlformats.org/presentationml/2006/main">
+  <p:cSld>
+    <p:spTree>
+      <p:nvGrpSpPr>
+        <p:cNvPr id="1" name=""/>
+        <p:cNvGrpSpPr/>
+        <p:nvPr/>
+      </p:nvGrpSpPr>
+      <p:grpSpPr/>
+      <p:sp>
+        <p:nvSpPr>
+          <p:cNvPr id="6" name="Title 5"/>
+          <p:cNvSpPr>
+            <a:spLocks noGrp="1"/>
+          </p:cNvSpPr>
+          <p:nvPr>
+            <p:ph type="title"/>
+          </p:nvPr>
+        </p:nvSpPr>
+        <p:spPr/>
+        <p:txBody>
+          <a:bodyPr/>
+          <a:p>
+            <a:endParaRPr lang="en-US"/>
+          </a:p>
+        </p:txBody>
+      </p:sp>
+      <p:sp>
+        <p:nvSpPr>
+          <p:cNvPr id="4" name="Slide Number Placeholder 3"/>
+          <p:cNvSpPr>
+            <a:spLocks noGrp="1"/>
+          </p:cNvSpPr>
+          <p:nvPr>
+            <p:ph type="sldNum" sz="quarter" idx="7"/>
+          </p:nvPr>
+        </p:nvSpPr>
+        <p:spPr/>
+        <p:txBody>
+          <a:bodyPr/>
+          <a:p>
+            <a:fld id="{B6F15528-21DE-4FAA-801E-634DDDAF4B2B}" type="slidenum">
+              <a:rPr/>
+            </a:fld>
+            <a:endParaRPr/>
+          </a:p>
+        </p:txBody>
+      </p:sp>
+      <p:sp>
+        <p:nvSpPr>
+          <p:cNvPr id="7" name="Content Placeholder 6"/>
+          <p:cNvSpPr>
+            <a:spLocks noGrp="1"/>
+          </p:cNvSpPr>
+          <p:nvPr>
+            <p:ph sz="half" idx="3"/>
+          </p:nvPr>
+        </p:nvSpPr>
+        <p:spPr/>
+        <p:txBody>
+          <a:bodyPr/>
+          <a:p>
+            <a:endParaRPr lang="en-US"/>
+          </a:p>
+        </p:txBody>
+      </p:sp>
+      <p:pic>
+        <p:nvPicPr>
+          <p:cNvPr id="5" name="Content Placeholder 4"/>
+          <p:cNvPicPr>
+            <a:picLocks noChangeAspect="1"/>
+          </p:cNvPicPr>
+          <p:nvPr>
+            <p:ph sz="half" idx="2"/>
+          </p:nvPr>
+        </p:nvPicPr>
+        <p:blipFill>
+          <a:blip r:embed="rId1"/>
+          <a:stretch>
+            <a:fillRect/>
+          </a:stretch>
+        </p:blipFill>
+        <p:spPr>
+          <a:xfrm>
+            <a:off x="609600" y="152400"/>
+            <a:ext cx="11024235" cy="6616700"/>
+          </a:xfrm>
+          <a:prstGeom prst="rect">
+            <a:avLst/>
+          </a:prstGeom>
+        </p:spPr>
+      </p:pic>
+    </p:spTree>
+  </p:cSld>
+  <p:clrMapOvr>
+    <a:masterClrMapping/>
+  </p:clrMapOvr>
+</p:sld>
+</file>
+
+<file path=ppt/slides/slide31.xml><?xml version="1.0" encoding="utf-8"?>
+<p:sld xmlns:a="http://schemas.openxmlformats.org/drawingml/2006/main" xmlns:r="http://schemas.openxmlformats.org/officeDocument/2006/relationships" xmlns:p="http://schemas.openxmlformats.org/presentationml/2006/main">
+  <p:cSld>
+    <p:spTree>
+      <p:nvGrpSpPr>
+        <p:cNvPr id="1" name=""/>
+        <p:cNvGrpSpPr/>
+        <p:nvPr/>
+      </p:nvGrpSpPr>
+      <p:grpSpPr/>
+      <p:sp>
+        <p:nvSpPr>
+          <p:cNvPr id="6" name="Title 5"/>
+          <p:cNvSpPr>
+            <a:spLocks noGrp="1"/>
+          </p:cNvSpPr>
+          <p:nvPr>
+            <p:ph type="title"/>
+          </p:nvPr>
+        </p:nvSpPr>
+        <p:spPr/>
+        <p:txBody>
+          <a:bodyPr/>
+          <a:p>
+            <a:endParaRPr lang="en-US"/>
+          </a:p>
+        </p:txBody>
+      </p:sp>
+      <p:sp>
+        <p:nvSpPr>
+          <p:cNvPr id="4" name="Slide Number Placeholder 3"/>
+          <p:cNvSpPr>
+            <a:spLocks noGrp="1"/>
+          </p:cNvSpPr>
+          <p:nvPr>
+            <p:ph type="sldNum" sz="quarter" idx="7"/>
+          </p:nvPr>
+        </p:nvSpPr>
+        <p:spPr/>
+        <p:txBody>
+          <a:bodyPr/>
+          <a:p>
+            <a:fld id="{B6F15528-21DE-4FAA-801E-634DDDAF4B2B}" type="slidenum">
+              <a:rPr/>
+            </a:fld>
+            <a:endParaRPr/>
+          </a:p>
+        </p:txBody>
+      </p:sp>
+      <p:sp>
+        <p:nvSpPr>
+          <p:cNvPr id="7" name="Content Placeholder 6"/>
+          <p:cNvSpPr>
+            <a:spLocks noGrp="1"/>
+          </p:cNvSpPr>
+          <p:nvPr>
+            <p:ph sz="half" idx="3"/>
+          </p:nvPr>
+        </p:nvSpPr>
+        <p:spPr/>
+        <p:txBody>
+          <a:bodyPr/>
+          <a:p>
+            <a:endParaRPr lang="en-US"/>
+          </a:p>
+        </p:txBody>
+      </p:sp>
+      <p:pic>
+        <p:nvPicPr>
+          <p:cNvPr id="5" name="Content Placeholder 4"/>
+          <p:cNvPicPr>
+            <a:picLocks noChangeAspect="1"/>
+          </p:cNvPicPr>
+          <p:nvPr>
+            <p:ph sz="half" idx="2"/>
+          </p:nvPr>
+        </p:nvPicPr>
+        <p:blipFill>
+          <a:blip r:embed="rId1"/>
+          <a:stretch>
+            <a:fillRect/>
+          </a:stretch>
+        </p:blipFill>
+        <p:spPr>
+          <a:xfrm>
+            <a:off x="304800" y="228600"/>
+            <a:ext cx="11537950" cy="5967730"/>
+          </a:xfrm>
+          <a:prstGeom prst="rect">
+            <a:avLst/>
+          </a:prstGeom>
+        </p:spPr>
+      </p:pic>
+    </p:spTree>
+  </p:cSld>
+  <p:clrMapOvr>
+    <a:masterClrMapping/>
+  </p:clrMapOvr>
+</p:sld>
+</file>
+
+<file path=ppt/slides/slide32.xml><?xml version="1.0" encoding="utf-8"?>
+<p:sld xmlns:a="http://schemas.openxmlformats.org/drawingml/2006/main" xmlns:r="http://schemas.openxmlformats.org/officeDocument/2006/relationships" xmlns:p="http://schemas.openxmlformats.org/presentationml/2006/main">
+  <p:cSld>
+    <p:spTree>
+      <p:nvGrpSpPr>
+        <p:cNvPr id="1" name=""/>
+        <p:cNvGrpSpPr/>
+        <p:nvPr/>
+      </p:nvGrpSpPr>
+      <p:grpSpPr>
+        <a:xfrm>
+          <a:off x="0" y="0"/>
+          <a:ext cx="0" cy="0"/>
+          <a:chOff x="0" y="0"/>
+          <a:chExt cx="0" cy="0"/>
+        </a:xfrm>
+      </p:grpSpPr>
+      <p:pic>
+        <p:nvPicPr>
+          <p:cNvPr id="2" name="object 2"/>
+          <p:cNvPicPr/>
+          <p:nvPr/>
+        </p:nvPicPr>
+        <p:blipFill>
+          <a:blip r:embed="rId1" cstate="print"/>
+          <a:stretch>
+            <a:fillRect/>
+          </a:stretch>
+        </p:blipFill>
+        <p:spPr>
+          <a:xfrm>
+            <a:off x="0" y="0"/>
+            <a:ext cx="4636008" cy="6858000"/>
+          </a:xfrm>
+          <a:prstGeom prst="rect">
+            <a:avLst/>
+          </a:prstGeom>
+        </p:spPr>
+      </p:pic>
+      <p:pic>
+        <p:nvPicPr>
+          <p:cNvPr id="3" name="object 3"/>
+          <p:cNvPicPr/>
+          <p:nvPr/>
+        </p:nvPicPr>
+        <p:blipFill>
+          <a:blip r:embed="rId2" cstate="print"/>
+          <a:stretch>
+            <a:fillRect/>
+          </a:stretch>
+        </p:blipFill>
+        <p:spPr>
+          <a:xfrm>
+            <a:off x="5000878" y="1952244"/>
+            <a:ext cx="5787390" cy="365760"/>
+          </a:xfrm>
+          <a:prstGeom prst="rect">
+            <a:avLst/>
+          </a:prstGeom>
+        </p:spPr>
+      </p:pic>
+      <p:pic>
+        <p:nvPicPr>
+          <p:cNvPr id="4" name="object 4"/>
+          <p:cNvPicPr/>
+          <p:nvPr/>
+        </p:nvPicPr>
+        <p:blipFill>
+          <a:blip r:embed="rId3" cstate="print"/>
+          <a:stretch>
+            <a:fillRect/>
+          </a:stretch>
+        </p:blipFill>
+        <p:spPr>
+          <a:xfrm>
+            <a:off x="5000878" y="2546857"/>
+            <a:ext cx="5545074" cy="365760"/>
+          </a:xfrm>
+          <a:prstGeom prst="rect">
+            <a:avLst/>
+          </a:prstGeom>
+        </p:spPr>
+      </p:pic>
+      <p:pic>
+        <p:nvPicPr>
+          <p:cNvPr id="5" name="object 5"/>
+          <p:cNvPicPr/>
+          <p:nvPr/>
+        </p:nvPicPr>
+        <p:blipFill>
+          <a:blip r:embed="rId4" cstate="print"/>
+          <a:stretch>
+            <a:fillRect/>
+          </a:stretch>
+        </p:blipFill>
+        <p:spPr>
+          <a:xfrm>
+            <a:off x="5000878" y="3141217"/>
+            <a:ext cx="3029966" cy="365760"/>
+          </a:xfrm>
+          <a:prstGeom prst="rect">
+            <a:avLst/>
+          </a:prstGeom>
+        </p:spPr>
+      </p:pic>
+      <p:pic>
+        <p:nvPicPr>
+          <p:cNvPr id="6" name="object 6"/>
+          <p:cNvPicPr/>
+          <p:nvPr/>
+        </p:nvPicPr>
+        <p:blipFill>
+          <a:blip r:embed="rId5" cstate="print"/>
+          <a:stretch>
+            <a:fillRect/>
+          </a:stretch>
+        </p:blipFill>
+        <p:spPr>
+          <a:xfrm>
+            <a:off x="5000878" y="3735654"/>
+            <a:ext cx="5201538" cy="366064"/>
+          </a:xfrm>
+          <a:prstGeom prst="rect">
+            <a:avLst/>
+          </a:prstGeom>
+        </p:spPr>
+      </p:pic>
+      <p:pic>
+        <p:nvPicPr>
+          <p:cNvPr id="7" name="object 7"/>
+          <p:cNvPicPr/>
+          <p:nvPr/>
+        </p:nvPicPr>
+        <p:blipFill>
+          <a:blip r:embed="rId6" cstate="print"/>
+          <a:stretch>
+            <a:fillRect/>
+          </a:stretch>
+        </p:blipFill>
+        <p:spPr>
+          <a:xfrm>
+            <a:off x="5000878" y="4330319"/>
+            <a:ext cx="4302759" cy="365760"/>
+          </a:xfrm>
+          <a:prstGeom prst="rect">
+            <a:avLst/>
+          </a:prstGeom>
+        </p:spPr>
+      </p:pic>
+      <p:pic>
+        <p:nvPicPr>
+          <p:cNvPr id="8" name="object 8"/>
+          <p:cNvPicPr/>
+          <p:nvPr/>
+        </p:nvPicPr>
+        <p:blipFill>
+          <a:blip r:embed="rId7" cstate="print"/>
+          <a:stretch>
+            <a:fillRect/>
+          </a:stretch>
+        </p:blipFill>
+        <p:spPr>
+          <a:xfrm>
+            <a:off x="1239926" y="1947926"/>
+            <a:ext cx="2463165" cy="548639"/>
+          </a:xfrm>
+          <a:prstGeom prst="rect">
+            <a:avLst/>
+          </a:prstGeom>
+        </p:spPr>
+      </p:pic>
+      <p:sp>
+        <p:nvSpPr>
+          <p:cNvPr id="9" name="Slide Number Placeholder 8"/>
           <p:cNvSpPr>
             <a:spLocks noGrp="1"/>
           </p:cNvSpPr>

</xml_diff>